<commit_message>
Added acknowledgement of NSA funding
</commit_message>
<xml_diff>
--- a/Common-and-Prerequisite-Material/Data_Representation/DataRepresentation.pptx
+++ b/Common-and-Prerequisite-Material/Data_Representation/DataRepresentation.pptx
@@ -279,7 +279,7 @@
               <a:pPr>
                 <a:defRPr/>
               </a:pPr>
-              <a:t>3/23/2018</a:t>
+              <a:t>4/24/18</a:t>
             </a:fld>
             <a:endParaRPr lang="en-US"/>
           </a:p>
@@ -3272,7 +3272,7 @@
           <p:cNvPr id="3" name="Slide Number Placeholder 2">
             <a:extLst>
               <a:ext uri="{FF2B5EF4-FFF2-40B4-BE49-F238E27FC236}">
-                <a16:creationId xmlns:a16="http://schemas.microsoft.com/office/drawing/2014/main" id="{7D2FFADE-E1BC-48C1-83AA-6DDDD39A33C4}"/>
+                <a16:creationId xmlns="" xmlns:a16="http://schemas.microsoft.com/office/drawing/2014/main" id="{7D2FFADE-E1BC-48C1-83AA-6DDDD39A33C4}"/>
               </a:ext>
             </a:extLst>
           </p:cNvPr>
@@ -3307,7 +3307,7 @@
           <p:cNvPr id="9" name="Picture 8">
             <a:extLst>
               <a:ext uri="{FF2B5EF4-FFF2-40B4-BE49-F238E27FC236}">
-                <a16:creationId xmlns:a16="http://schemas.microsoft.com/office/drawing/2014/main" id="{9CBFC76A-A606-42CF-BCDF-C73975C150B9}"/>
+                <a16:creationId xmlns="" xmlns:a16="http://schemas.microsoft.com/office/drawing/2014/main" id="{9CBFC76A-A606-42CF-BCDF-C73975C150B9}"/>
               </a:ext>
             </a:extLst>
           </p:cNvPr>
@@ -3337,7 +3337,7 @@
           <p:cNvPr id="4" name="Title 3">
             <a:extLst>
               <a:ext uri="{FF2B5EF4-FFF2-40B4-BE49-F238E27FC236}">
-                <a16:creationId xmlns:a16="http://schemas.microsoft.com/office/drawing/2014/main" id="{B88392DE-AA16-4A19-B18F-6CD2BBB49498}"/>
+                <a16:creationId xmlns="" xmlns:a16="http://schemas.microsoft.com/office/drawing/2014/main" id="{B88392DE-AA16-4A19-B18F-6CD2BBB49498}"/>
               </a:ext>
             </a:extLst>
           </p:cNvPr>
@@ -4310,6 +4310,14 @@
           <a:bodyPr/>
           <a:lstStyle/>
           <a:p>
+            <a:r>
+              <a:rPr lang="en-US" dirty="0">
+                <a:solidFill>
+                  <a:srgbClr val="FF00FF"/>
+                </a:solidFill>
+              </a:rPr>
+              <a:t/>
+            </a:r>
             <a:br>
               <a:rPr lang="en-US" dirty="0">
                 <a:solidFill>
@@ -4317,6 +4325,14 @@
                 </a:solidFill>
               </a:rPr>
             </a:br>
+            <a:r>
+              <a:rPr lang="en-US" dirty="0">
+                <a:solidFill>
+                  <a:srgbClr val="FF00FF"/>
+                </a:solidFill>
+              </a:rPr>
+              <a:t/>
+            </a:r>
             <a:br>
               <a:rPr lang="en-US" dirty="0">
                 <a:solidFill>
@@ -4398,7 +4414,7 @@
           <p:cNvPr id="2" name="Title 1">
             <a:extLst>
               <a:ext uri="{FF2B5EF4-FFF2-40B4-BE49-F238E27FC236}">
-                <a16:creationId xmlns:a16="http://schemas.microsoft.com/office/drawing/2014/main" id="{7A1E2AE1-0B20-4713-8BFF-79FC519AF42A}"/>
+                <a16:creationId xmlns="" xmlns:a16="http://schemas.microsoft.com/office/drawing/2014/main" id="{7A1E2AE1-0B20-4713-8BFF-79FC519AF42A}"/>
               </a:ext>
             </a:extLst>
           </p:cNvPr>
@@ -4426,7 +4442,7 @@
           <p:cNvPr id="3" name="Content Placeholder 2">
             <a:extLst>
               <a:ext uri="{FF2B5EF4-FFF2-40B4-BE49-F238E27FC236}">
-                <a16:creationId xmlns:a16="http://schemas.microsoft.com/office/drawing/2014/main" id="{703B37FE-8792-4B89-A2C7-D5A5F70421D5}"/>
+                <a16:creationId xmlns="" xmlns:a16="http://schemas.microsoft.com/office/drawing/2014/main" id="{703B37FE-8792-4B89-A2C7-D5A5F70421D5}"/>
               </a:ext>
             </a:extLst>
           </p:cNvPr>
@@ -4511,7 +4527,7 @@
           <p:cNvPr id="4" name="Slide Number Placeholder 3">
             <a:extLst>
               <a:ext uri="{FF2B5EF4-FFF2-40B4-BE49-F238E27FC236}">
-                <a16:creationId xmlns:a16="http://schemas.microsoft.com/office/drawing/2014/main" id="{CEE54AC2-ACA8-4B0C-8BC8-238D283B901C}"/>
+                <a16:creationId xmlns="" xmlns:a16="http://schemas.microsoft.com/office/drawing/2014/main" id="{CEE54AC2-ACA8-4B0C-8BC8-238D283B901C}"/>
               </a:ext>
             </a:extLst>
           </p:cNvPr>
@@ -4579,7 +4595,7 @@
           <p:cNvPr id="2" name="Title 1">
             <a:extLst>
               <a:ext uri="{FF2B5EF4-FFF2-40B4-BE49-F238E27FC236}">
-                <a16:creationId xmlns:a16="http://schemas.microsoft.com/office/drawing/2014/main" id="{B312597D-E1E8-4D29-86FF-30BA5595C23B}"/>
+                <a16:creationId xmlns="" xmlns:a16="http://schemas.microsoft.com/office/drawing/2014/main" id="{B312597D-E1E8-4D29-86FF-30BA5595C23B}"/>
               </a:ext>
             </a:extLst>
           </p:cNvPr>
@@ -4607,7 +4623,7 @@
           <p:cNvPr id="3" name="Content Placeholder 2">
             <a:extLst>
               <a:ext uri="{FF2B5EF4-FFF2-40B4-BE49-F238E27FC236}">
-                <a16:creationId xmlns:a16="http://schemas.microsoft.com/office/drawing/2014/main" id="{27560E63-A707-4FF8-A5F9-375F6E873685}"/>
+                <a16:creationId xmlns="" xmlns:a16="http://schemas.microsoft.com/office/drawing/2014/main" id="{27560E63-A707-4FF8-A5F9-375F6E873685}"/>
               </a:ext>
             </a:extLst>
           </p:cNvPr>
@@ -4692,7 +4708,7 @@
           <p:cNvPr id="4" name="Slide Number Placeholder 3">
             <a:extLst>
               <a:ext uri="{FF2B5EF4-FFF2-40B4-BE49-F238E27FC236}">
-                <a16:creationId xmlns:a16="http://schemas.microsoft.com/office/drawing/2014/main" id="{F09B9EF5-C358-4721-8FC3-1121866E2BD1}"/>
+                <a16:creationId xmlns="" xmlns:a16="http://schemas.microsoft.com/office/drawing/2014/main" id="{F09B9EF5-C358-4721-8FC3-1121866E2BD1}"/>
               </a:ext>
             </a:extLst>
           </p:cNvPr>
@@ -4760,7 +4776,7 @@
           <p:cNvPr id="7" name="Slide Number Placeholder 6">
             <a:extLst>
               <a:ext uri="{FF2B5EF4-FFF2-40B4-BE49-F238E27FC236}">
-                <a16:creationId xmlns:a16="http://schemas.microsoft.com/office/drawing/2014/main" id="{27B55DC7-B95B-4807-B808-1E7A81E0F45A}"/>
+                <a16:creationId xmlns="" xmlns:a16="http://schemas.microsoft.com/office/drawing/2014/main" id="{27B55DC7-B95B-4807-B808-1E7A81E0F45A}"/>
               </a:ext>
             </a:extLst>
           </p:cNvPr>
@@ -4787,38 +4803,10 @@
       </p:sp>
       <p:sp>
         <p:nvSpPr>
-          <p:cNvPr id="18" name="Title 17">
-            <a:extLst>
-              <a:ext uri="{FF2B5EF4-FFF2-40B4-BE49-F238E27FC236}">
-                <a16:creationId xmlns:a16="http://schemas.microsoft.com/office/drawing/2014/main" id="{3129924B-5BF1-44AC-A173-AADF01D40E56}"/>
-              </a:ext>
-            </a:extLst>
-          </p:cNvPr>
-          <p:cNvSpPr>
-            <a:spLocks noGrp="1"/>
-          </p:cNvSpPr>
-          <p:nvPr>
-            <p:ph type="title"/>
-          </p:nvPr>
-        </p:nvSpPr>
-        <p:spPr/>
-        <p:txBody>
-          <a:bodyPr/>
-          <a:lstStyle/>
-          <a:p>
-            <a:r>
-              <a:rPr lang="en-US" dirty="0"/>
-              <a:t>Credits</a:t>
-            </a:r>
-          </a:p>
-        </p:txBody>
-      </p:sp>
-      <p:sp>
-        <p:nvSpPr>
           <p:cNvPr id="19" name="Text Placeholder 7">
             <a:extLst>
               <a:ext uri="{FF2B5EF4-FFF2-40B4-BE49-F238E27FC236}">
-                <a16:creationId xmlns:a16="http://schemas.microsoft.com/office/drawing/2014/main" id="{2785A2B3-FCF4-4D59-9841-12917D91B27A}"/>
+                <a16:creationId xmlns="" xmlns:a16="http://schemas.microsoft.com/office/drawing/2014/main" id="{2785A2B3-FCF4-4D59-9841-12917D91B27A}"/>
               </a:ext>
             </a:extLst>
           </p:cNvPr>
@@ -5025,24 +5013,52 @@
             <a:br>
               <a:rPr lang="en-US" dirty="0"/>
             </a:br>
+            <a:r>
+              <a:rPr lang="en-US" dirty="0"/>
+              <a:t/>
+            </a:r>
             <a:br>
               <a:rPr lang="en-US" dirty="0"/>
             </a:br>
+            <a:r>
+              <a:rPr lang="en-US" dirty="0"/>
+              <a:t/>
+            </a:r>
             <a:br>
               <a:rPr lang="en-US" dirty="0"/>
             </a:br>
+            <a:r>
+              <a:rPr lang="en-US" dirty="0"/>
+              <a:t/>
+            </a:r>
             <a:br>
               <a:rPr lang="en-US" dirty="0"/>
             </a:br>
+            <a:r>
+              <a:rPr lang="en-US" dirty="0"/>
+              <a:t/>
+            </a:r>
             <a:br>
               <a:rPr lang="en-US" dirty="0"/>
             </a:br>
+            <a:r>
+              <a:rPr lang="en-US" dirty="0"/>
+              <a:t/>
+            </a:r>
             <a:br>
               <a:rPr lang="en-US" dirty="0"/>
             </a:br>
+            <a:r>
+              <a:rPr lang="en-US" dirty="0"/>
+              <a:t/>
+            </a:r>
             <a:br>
               <a:rPr lang="en-US" dirty="0"/>
             </a:br>
+            <a:r>
+              <a:rPr lang="en-US" dirty="0"/>
+              <a:t/>
+            </a:r>
             <a:br>
               <a:rPr lang="en-US" dirty="0"/>
             </a:br>
@@ -5050,33 +5066,58 @@
           </a:p>
           <a:p>
             <a:r>
-              <a:rPr lang="en-US" dirty="0"/>
+              <a:rPr lang="en-US" sz="1600" dirty="0"/>
               <a:t>Except where otherwise noted, this work is licensed under https://creativecommons.org/licenses/by-nc-sa/4.0/</a:t>
             </a:r>
             <a:br>
-              <a:rPr lang="en-US" dirty="0"/>
+              <a:rPr lang="en-US" sz="1600" dirty="0"/>
             </a:br>
+            <a:r>
+              <a:rPr lang="en-US" sz="1600" dirty="0"/>
+              <a:t/>
+            </a:r>
             <a:br>
-              <a:rPr lang="en-US" dirty="0"/>
+              <a:rPr lang="en-US" sz="1600" dirty="0"/>
             </a:br>
             <a:r>
-              <a:rPr lang="en-US" dirty="0"/>
+              <a:rPr lang="en-US" sz="1600" dirty="0"/>
               <a:t>Not withstanding the non-commercial license terms, non-profit educational institutions are granted a non-exclusive license to adapt and use this material, with attribution.</a:t>
             </a:r>
             <a:br>
-              <a:rPr lang="en-US" dirty="0"/>
+              <a:rPr lang="en-US" sz="1600" dirty="0"/>
             </a:br>
+            <a:r>
+              <a:rPr lang="en-US" sz="1600" dirty="0"/>
+              <a:t/>
+            </a:r>
             <a:br>
-              <a:rPr lang="en-US" dirty="0"/>
+              <a:rPr lang="en-US" sz="1600" dirty="0"/>
             </a:br>
             <a:r>
-              <a:rPr lang="en-US" dirty="0"/>
-              <a:t>Creative Commons and the double C in a circle are registered trademarks of Creative commons in the United States and other countries. Third party marks and brands are the property of their respective holders.</a:t>
-            </a:r>
-            <a:br>
-              <a:rPr lang="en-US" dirty="0"/>
-            </a:br>
-            <a:endParaRPr lang="en-US" dirty="0"/>
+              <a:rPr lang="en-US" sz="1600" dirty="0"/>
+              <a:t>Creative Commons and the double C in a circle are registered trademarks of Creative commons in the United States and other countries. Third party marks and brands are the property of their respective holders</a:t>
+            </a:r>
+            <a:r>
+              <a:rPr lang="en-US" sz="1600" dirty="0" smtClean="0"/>
+              <a:t>.</a:t>
+            </a:r>
+          </a:p>
+          <a:p>
+            <a:r>
+              <a:rPr lang="en-US" sz="1600" dirty="0"/>
+              <a:t>Project sponsored by the National Security Agency under grant Number </a:t>
+            </a:r>
+            <a:r>
+              <a:rPr lang="en-US" sz="1600" dirty="0" smtClean="0"/>
+              <a:t>H98230-17-1-0199. The </a:t>
+            </a:r>
+            <a:r>
+              <a:rPr lang="en-US" sz="1600" dirty="0"/>
+              <a:t>United States Government is authorized to reproduce and distribute reprints notwithstanding any copyright notation herein.</a:t>
+            </a:r>
+          </a:p>
+          <a:p>
+            <a:endParaRPr lang="en-US" sz="1600" dirty="0"/>
           </a:p>
         </p:txBody>
       </p:sp>
@@ -5208,7 +5249,7 @@
           <p:cNvPr id="3" name="Slide Number Placeholder 2">
             <a:extLst>
               <a:ext uri="{FF2B5EF4-FFF2-40B4-BE49-F238E27FC236}">
-                <a16:creationId xmlns:a16="http://schemas.microsoft.com/office/drawing/2014/main" id="{0B1163B0-19D9-4859-8B88-CD4B646011C3}"/>
+                <a16:creationId xmlns="" xmlns:a16="http://schemas.microsoft.com/office/drawing/2014/main" id="{0B1163B0-19D9-4859-8B88-CD4B646011C3}"/>
               </a:ext>
             </a:extLst>
           </p:cNvPr>
@@ -5271,7 +5312,7 @@
           <p:cNvPr id="2" name="Title 1">
             <a:extLst>
               <a:ext uri="{FF2B5EF4-FFF2-40B4-BE49-F238E27FC236}">
-                <a16:creationId xmlns:a16="http://schemas.microsoft.com/office/drawing/2014/main" id="{0C0F2212-4D2F-4835-97FA-E69E6907AAC3}"/>
+                <a16:creationId xmlns="" xmlns:a16="http://schemas.microsoft.com/office/drawing/2014/main" id="{0C0F2212-4D2F-4835-97FA-E69E6907AAC3}"/>
               </a:ext>
             </a:extLst>
           </p:cNvPr>
@@ -5299,7 +5340,7 @@
           <p:cNvPr id="3" name="Content Placeholder 2">
             <a:extLst>
               <a:ext uri="{FF2B5EF4-FFF2-40B4-BE49-F238E27FC236}">
-                <a16:creationId xmlns:a16="http://schemas.microsoft.com/office/drawing/2014/main" id="{C5655DF2-588A-4E5D-B507-02478491A277}"/>
+                <a16:creationId xmlns="" xmlns:a16="http://schemas.microsoft.com/office/drawing/2014/main" id="{C5655DF2-588A-4E5D-B507-02478491A277}"/>
               </a:ext>
             </a:extLst>
           </p:cNvPr>
@@ -5354,7 +5395,7 @@
           <p:cNvPr id="4" name="Slide Number Placeholder 3">
             <a:extLst>
               <a:ext uri="{FF2B5EF4-FFF2-40B4-BE49-F238E27FC236}">
-                <a16:creationId xmlns:a16="http://schemas.microsoft.com/office/drawing/2014/main" id="{A57F4E43-C617-424D-BB94-C74734C10CAD}"/>
+                <a16:creationId xmlns="" xmlns:a16="http://schemas.microsoft.com/office/drawing/2014/main" id="{A57F4E43-C617-424D-BB94-C74734C10CAD}"/>
               </a:ext>
             </a:extLst>
           </p:cNvPr>
@@ -5422,7 +5463,7 @@
           <p:cNvPr id="2" name="Title 1">
             <a:extLst>
               <a:ext uri="{FF2B5EF4-FFF2-40B4-BE49-F238E27FC236}">
-                <a16:creationId xmlns:a16="http://schemas.microsoft.com/office/drawing/2014/main" id="{1A7F97A7-5FBE-4483-8F6E-A8D66588988B}"/>
+                <a16:creationId xmlns="" xmlns:a16="http://schemas.microsoft.com/office/drawing/2014/main" id="{1A7F97A7-5FBE-4483-8F6E-A8D66588988B}"/>
               </a:ext>
             </a:extLst>
           </p:cNvPr>
@@ -5450,7 +5491,7 @@
           <p:cNvPr id="3" name="Content Placeholder 2">
             <a:extLst>
               <a:ext uri="{FF2B5EF4-FFF2-40B4-BE49-F238E27FC236}">
-                <a16:creationId xmlns:a16="http://schemas.microsoft.com/office/drawing/2014/main" id="{08AAA87F-65F3-48C9-97D9-231631E4809F}"/>
+                <a16:creationId xmlns="" xmlns:a16="http://schemas.microsoft.com/office/drawing/2014/main" id="{08AAA87F-65F3-48C9-97D9-231631E4809F}"/>
               </a:ext>
             </a:extLst>
           </p:cNvPr>
@@ -5535,7 +5576,7 @@
           <p:cNvPr id="4" name="Slide Number Placeholder 3">
             <a:extLst>
               <a:ext uri="{FF2B5EF4-FFF2-40B4-BE49-F238E27FC236}">
-                <a16:creationId xmlns:a16="http://schemas.microsoft.com/office/drawing/2014/main" id="{3C4B01EF-0506-4FD7-9964-75D1534FA10B}"/>
+                <a16:creationId xmlns="" xmlns:a16="http://schemas.microsoft.com/office/drawing/2014/main" id="{3C4B01EF-0506-4FD7-9964-75D1534FA10B}"/>
               </a:ext>
             </a:extLst>
           </p:cNvPr>
@@ -5603,7 +5644,7 @@
           <p:cNvPr id="2" name="Title 1">
             <a:extLst>
               <a:ext uri="{FF2B5EF4-FFF2-40B4-BE49-F238E27FC236}">
-                <a16:creationId xmlns:a16="http://schemas.microsoft.com/office/drawing/2014/main" id="{FDB48419-3C9A-455E-9611-2A3D0B82C21C}"/>
+                <a16:creationId xmlns="" xmlns:a16="http://schemas.microsoft.com/office/drawing/2014/main" id="{FDB48419-3C9A-455E-9611-2A3D0B82C21C}"/>
               </a:ext>
             </a:extLst>
           </p:cNvPr>
@@ -5631,7 +5672,7 @@
           <p:cNvPr id="3" name="Content Placeholder 2">
             <a:extLst>
               <a:ext uri="{FF2B5EF4-FFF2-40B4-BE49-F238E27FC236}">
-                <a16:creationId xmlns:a16="http://schemas.microsoft.com/office/drawing/2014/main" id="{9E273BBD-1B64-4A21-938A-7FE285E19F56}"/>
+                <a16:creationId xmlns="" xmlns:a16="http://schemas.microsoft.com/office/drawing/2014/main" id="{9E273BBD-1B64-4A21-938A-7FE285E19F56}"/>
               </a:ext>
             </a:extLst>
           </p:cNvPr>
@@ -5717,7 +5758,7 @@
           <p:cNvPr id="4" name="Slide Number Placeholder 3">
             <a:extLst>
               <a:ext uri="{FF2B5EF4-FFF2-40B4-BE49-F238E27FC236}">
-                <a16:creationId xmlns:a16="http://schemas.microsoft.com/office/drawing/2014/main" id="{98132DAB-96EC-4341-A114-DE7A1355B347}"/>
+                <a16:creationId xmlns="" xmlns:a16="http://schemas.microsoft.com/office/drawing/2014/main" id="{98132DAB-96EC-4341-A114-DE7A1355B347}"/>
               </a:ext>
             </a:extLst>
           </p:cNvPr>
@@ -5785,7 +5826,7 @@
           <p:cNvPr id="2" name="Title 1">
             <a:extLst>
               <a:ext uri="{FF2B5EF4-FFF2-40B4-BE49-F238E27FC236}">
-                <a16:creationId xmlns:a16="http://schemas.microsoft.com/office/drawing/2014/main" id="{4D52F66D-5E3F-4E9A-B314-9C603116F4B7}"/>
+                <a16:creationId xmlns="" xmlns:a16="http://schemas.microsoft.com/office/drawing/2014/main" id="{4D52F66D-5E3F-4E9A-B314-9C603116F4B7}"/>
               </a:ext>
             </a:extLst>
           </p:cNvPr>
@@ -5813,7 +5854,7 @@
           <p:cNvPr id="3" name="Content Placeholder 2">
             <a:extLst>
               <a:ext uri="{FF2B5EF4-FFF2-40B4-BE49-F238E27FC236}">
-                <a16:creationId xmlns:a16="http://schemas.microsoft.com/office/drawing/2014/main" id="{535153DB-3A52-4241-8CC6-DE293083C2C4}"/>
+                <a16:creationId xmlns="" xmlns:a16="http://schemas.microsoft.com/office/drawing/2014/main" id="{535153DB-3A52-4241-8CC6-DE293083C2C4}"/>
               </a:ext>
             </a:extLst>
           </p:cNvPr>
@@ -6447,7 +6488,7 @@
           <p:cNvPr id="4" name="Slide Number Placeholder 3">
             <a:extLst>
               <a:ext uri="{FF2B5EF4-FFF2-40B4-BE49-F238E27FC236}">
-                <a16:creationId xmlns:a16="http://schemas.microsoft.com/office/drawing/2014/main" id="{BBD8546C-7884-45D8-AF7F-DE50B5691555}"/>
+                <a16:creationId xmlns="" xmlns:a16="http://schemas.microsoft.com/office/drawing/2014/main" id="{BBD8546C-7884-45D8-AF7F-DE50B5691555}"/>
               </a:ext>
             </a:extLst>
           </p:cNvPr>
@@ -6515,7 +6556,7 @@
           <p:cNvPr id="2" name="Title 1">
             <a:extLst>
               <a:ext uri="{FF2B5EF4-FFF2-40B4-BE49-F238E27FC236}">
-                <a16:creationId xmlns:a16="http://schemas.microsoft.com/office/drawing/2014/main" id="{864A14F1-8F11-459B-90DA-DB4EFD9A7281}"/>
+                <a16:creationId xmlns="" xmlns:a16="http://schemas.microsoft.com/office/drawing/2014/main" id="{864A14F1-8F11-459B-90DA-DB4EFD9A7281}"/>
               </a:ext>
             </a:extLst>
           </p:cNvPr>
@@ -6543,7 +6584,7 @@
           <p:cNvPr id="3" name="Content Placeholder 2">
             <a:extLst>
               <a:ext uri="{FF2B5EF4-FFF2-40B4-BE49-F238E27FC236}">
-                <a16:creationId xmlns:a16="http://schemas.microsoft.com/office/drawing/2014/main" id="{94053964-0C29-454C-8160-D8B96745950B}"/>
+                <a16:creationId xmlns="" xmlns:a16="http://schemas.microsoft.com/office/drawing/2014/main" id="{94053964-0C29-454C-8160-D8B96745950B}"/>
               </a:ext>
             </a:extLst>
           </p:cNvPr>
@@ -6668,7 +6709,7 @@
           <p:cNvPr id="4" name="Slide Number Placeholder 3">
             <a:extLst>
               <a:ext uri="{FF2B5EF4-FFF2-40B4-BE49-F238E27FC236}">
-                <a16:creationId xmlns:a16="http://schemas.microsoft.com/office/drawing/2014/main" id="{5A075144-F726-4710-8A44-30830A6FAC0E}"/>
+                <a16:creationId xmlns="" xmlns:a16="http://schemas.microsoft.com/office/drawing/2014/main" id="{5A075144-F726-4710-8A44-30830A6FAC0E}"/>
               </a:ext>
             </a:extLst>
           </p:cNvPr>
@@ -6736,7 +6777,7 @@
           <p:cNvPr id="2" name="Title 1">
             <a:extLst>
               <a:ext uri="{FF2B5EF4-FFF2-40B4-BE49-F238E27FC236}">
-                <a16:creationId xmlns:a16="http://schemas.microsoft.com/office/drawing/2014/main" id="{6A8AB29D-BE31-4082-90E5-15DF3ABA3673}"/>
+                <a16:creationId xmlns="" xmlns:a16="http://schemas.microsoft.com/office/drawing/2014/main" id="{6A8AB29D-BE31-4082-90E5-15DF3ABA3673}"/>
               </a:ext>
             </a:extLst>
           </p:cNvPr>
@@ -6764,7 +6805,7 @@
           <p:cNvPr id="3" name="Content Placeholder 2">
             <a:extLst>
               <a:ext uri="{FF2B5EF4-FFF2-40B4-BE49-F238E27FC236}">
-                <a16:creationId xmlns:a16="http://schemas.microsoft.com/office/drawing/2014/main" id="{72DD5C17-E9C0-4F43-93FB-EF482C6345D1}"/>
+                <a16:creationId xmlns="" xmlns:a16="http://schemas.microsoft.com/office/drawing/2014/main" id="{72DD5C17-E9C0-4F43-93FB-EF482C6345D1}"/>
               </a:ext>
             </a:extLst>
           </p:cNvPr>
@@ -6835,7 +6876,7 @@
           <p:cNvPr id="4" name="Slide Number Placeholder 3">
             <a:extLst>
               <a:ext uri="{FF2B5EF4-FFF2-40B4-BE49-F238E27FC236}">
-                <a16:creationId xmlns:a16="http://schemas.microsoft.com/office/drawing/2014/main" id="{3DBE2457-4F59-427E-8D05-6C2489DB0FCA}"/>
+                <a16:creationId xmlns="" xmlns:a16="http://schemas.microsoft.com/office/drawing/2014/main" id="{3DBE2457-4F59-427E-8D05-6C2489DB0FCA}"/>
               </a:ext>
             </a:extLst>
           </p:cNvPr>
@@ -6903,7 +6944,7 @@
           <p:cNvPr id="2" name="Title 1">
             <a:extLst>
               <a:ext uri="{FF2B5EF4-FFF2-40B4-BE49-F238E27FC236}">
-                <a16:creationId xmlns:a16="http://schemas.microsoft.com/office/drawing/2014/main" id="{9065E89E-11AA-4013-871A-7B0570264798}"/>
+                <a16:creationId xmlns="" xmlns:a16="http://schemas.microsoft.com/office/drawing/2014/main" id="{9065E89E-11AA-4013-871A-7B0570264798}"/>
               </a:ext>
             </a:extLst>
           </p:cNvPr>
@@ -6931,7 +6972,7 @@
           <p:cNvPr id="3" name="Content Placeholder 2">
             <a:extLst>
               <a:ext uri="{FF2B5EF4-FFF2-40B4-BE49-F238E27FC236}">
-                <a16:creationId xmlns:a16="http://schemas.microsoft.com/office/drawing/2014/main" id="{CB9CA527-5F86-40E3-98BD-DF52B1EFD970}"/>
+                <a16:creationId xmlns="" xmlns:a16="http://schemas.microsoft.com/office/drawing/2014/main" id="{CB9CA527-5F86-40E3-98BD-DF52B1EFD970}"/>
               </a:ext>
             </a:extLst>
           </p:cNvPr>
@@ -7007,7 +7048,7 @@
           <p:cNvPr id="4" name="Slide Number Placeholder 3">
             <a:extLst>
               <a:ext uri="{FF2B5EF4-FFF2-40B4-BE49-F238E27FC236}">
-                <a16:creationId xmlns:a16="http://schemas.microsoft.com/office/drawing/2014/main" id="{7C20D664-9AB6-45B9-99CC-923B724EA2D8}"/>
+                <a16:creationId xmlns="" xmlns:a16="http://schemas.microsoft.com/office/drawing/2014/main" id="{7C20D664-9AB6-45B9-99CC-923B724EA2D8}"/>
               </a:ext>
             </a:extLst>
           </p:cNvPr>
@@ -7042,7 +7083,7 @@
           <p:cNvPr id="5" name="Table 4">
             <a:extLst>
               <a:ext uri="{FF2B5EF4-FFF2-40B4-BE49-F238E27FC236}">
-                <a16:creationId xmlns:a16="http://schemas.microsoft.com/office/drawing/2014/main" id="{8738E106-852C-4FB7-9DC8-F2B54080324A}"/>
+                <a16:creationId xmlns="" xmlns:a16="http://schemas.microsoft.com/office/drawing/2014/main" id="{8738E106-852C-4FB7-9DC8-F2B54080324A}"/>
               </a:ext>
             </a:extLst>
           </p:cNvPr>
@@ -7071,21 +7112,21 @@
                 <a:gridCol w="1652722">
                   <a:extLst>
                     <a:ext uri="{9D8B030D-6E8A-4147-A177-3AD203B41FA5}">
-                      <a16:colId xmlns:a16="http://schemas.microsoft.com/office/drawing/2014/main" val="3013726457"/>
+                      <a16:colId xmlns="" xmlns:a16="http://schemas.microsoft.com/office/drawing/2014/main" val="3013726457"/>
                     </a:ext>
                   </a:extLst>
                 </a:gridCol>
                 <a:gridCol w="2836152">
                   <a:extLst>
                     <a:ext uri="{9D8B030D-6E8A-4147-A177-3AD203B41FA5}">
-                      <a16:colId xmlns:a16="http://schemas.microsoft.com/office/drawing/2014/main" val="2637374814"/>
+                      <a16:colId xmlns="" xmlns:a16="http://schemas.microsoft.com/office/drawing/2014/main" val="2637374814"/>
                     </a:ext>
                   </a:extLst>
                 </a:gridCol>
                 <a:gridCol w="2398569">
                   <a:extLst>
                     <a:ext uri="{9D8B030D-6E8A-4147-A177-3AD203B41FA5}">
-                      <a16:colId xmlns:a16="http://schemas.microsoft.com/office/drawing/2014/main" val="1178218593"/>
+                      <a16:colId xmlns="" xmlns:a16="http://schemas.microsoft.com/office/drawing/2014/main" val="1178218593"/>
                     </a:ext>
                   </a:extLst>
                 </a:gridCol>
@@ -7135,7 +7176,7 @@
                 </a:tc>
                 <a:extLst>
                   <a:ext uri="{0D108BD9-81ED-4DB2-BD59-A6C34878D82A}">
-                    <a16:rowId xmlns:a16="http://schemas.microsoft.com/office/drawing/2014/main" val="3907854285"/>
+                    <a16:rowId xmlns="" xmlns:a16="http://schemas.microsoft.com/office/drawing/2014/main" val="3907854285"/>
                   </a:ext>
                 </a:extLst>
               </a:tr>
@@ -7184,7 +7225,7 @@
                 </a:tc>
                 <a:extLst>
                   <a:ext uri="{0D108BD9-81ED-4DB2-BD59-A6C34878D82A}">
-                    <a16:rowId xmlns:a16="http://schemas.microsoft.com/office/drawing/2014/main" val="418161803"/>
+                    <a16:rowId xmlns="" xmlns:a16="http://schemas.microsoft.com/office/drawing/2014/main" val="418161803"/>
                   </a:ext>
                 </a:extLst>
               </a:tr>
@@ -7233,7 +7274,7 @@
                 </a:tc>
                 <a:extLst>
                   <a:ext uri="{0D108BD9-81ED-4DB2-BD59-A6C34878D82A}">
-                    <a16:rowId xmlns:a16="http://schemas.microsoft.com/office/drawing/2014/main" val="1014557354"/>
+                    <a16:rowId xmlns="" xmlns:a16="http://schemas.microsoft.com/office/drawing/2014/main" val="1014557354"/>
                   </a:ext>
                 </a:extLst>
               </a:tr>
@@ -7300,7 +7341,7 @@
                 </a:tc>
                 <a:extLst>
                   <a:ext uri="{0D108BD9-81ED-4DB2-BD59-A6C34878D82A}">
-                    <a16:rowId xmlns:a16="http://schemas.microsoft.com/office/drawing/2014/main" val="1544430529"/>
+                    <a16:rowId xmlns="" xmlns:a16="http://schemas.microsoft.com/office/drawing/2014/main" val="1544430529"/>
                   </a:ext>
                 </a:extLst>
               </a:tr>
@@ -7367,7 +7408,7 @@
                 </a:tc>
                 <a:extLst>
                   <a:ext uri="{0D108BD9-81ED-4DB2-BD59-A6C34878D82A}">
-                    <a16:rowId xmlns:a16="http://schemas.microsoft.com/office/drawing/2014/main" val="22504882"/>
+                    <a16:rowId xmlns="" xmlns:a16="http://schemas.microsoft.com/office/drawing/2014/main" val="22504882"/>
                   </a:ext>
                 </a:extLst>
               </a:tr>

</xml_diff>